<commit_message>
Fixed typo in image 3.3.7-indices.png #24
</commit_message>
<xml_diff>
--- a/notebooks/figure_prep/figures-3.3-indices.pptx
+++ b/notebooks/figure_prep/figures-3.3-indices.pptx
@@ -197,7 +197,7 @@
           <a:p>
             <a:fld id="{39CE8FB3-92B6-994A-BEDE-5C0FBD0BFD65}" type="datetimeFigureOut">
               <a:rPr lang="en-US" smtClean="0"/>
-              <a:t>1/15/24</a:t>
+              <a:t>11/27/24</a:t>
             </a:fld>
             <a:endParaRPr lang="en-US"/>
           </a:p>
@@ -695,7 +695,7 @@
           <a:p>
             <a:fld id="{B0F4EA63-B69E-FB4F-9474-178B77EAB39C}" type="datetimeFigureOut">
               <a:rPr lang="en-US" smtClean="0"/>
-              <a:t>1/15/24</a:t>
+              <a:t>11/27/24</a:t>
             </a:fld>
             <a:endParaRPr lang="en-US"/>
           </a:p>
@@ -893,7 +893,7 @@
           <a:p>
             <a:fld id="{B0F4EA63-B69E-FB4F-9474-178B77EAB39C}" type="datetimeFigureOut">
               <a:rPr lang="en-US" smtClean="0"/>
-              <a:t>1/15/24</a:t>
+              <a:t>11/27/24</a:t>
             </a:fld>
             <a:endParaRPr lang="en-US"/>
           </a:p>
@@ -1101,7 +1101,7 @@
           <a:p>
             <a:fld id="{B0F4EA63-B69E-FB4F-9474-178B77EAB39C}" type="datetimeFigureOut">
               <a:rPr lang="en-US" smtClean="0"/>
-              <a:t>1/15/24</a:t>
+              <a:t>11/27/24</a:t>
             </a:fld>
             <a:endParaRPr lang="en-US"/>
           </a:p>
@@ -1299,7 +1299,7 @@
           <a:p>
             <a:fld id="{B0F4EA63-B69E-FB4F-9474-178B77EAB39C}" type="datetimeFigureOut">
               <a:rPr lang="en-US" smtClean="0"/>
-              <a:t>1/15/24</a:t>
+              <a:t>11/27/24</a:t>
             </a:fld>
             <a:endParaRPr lang="en-US"/>
           </a:p>
@@ -1574,7 +1574,7 @@
           <a:p>
             <a:fld id="{B0F4EA63-B69E-FB4F-9474-178B77EAB39C}" type="datetimeFigureOut">
               <a:rPr lang="en-US" smtClean="0"/>
-              <a:t>1/15/24</a:t>
+              <a:t>11/27/24</a:t>
             </a:fld>
             <a:endParaRPr lang="en-US"/>
           </a:p>
@@ -1839,7 +1839,7 @@
           <a:p>
             <a:fld id="{B0F4EA63-B69E-FB4F-9474-178B77EAB39C}" type="datetimeFigureOut">
               <a:rPr lang="en-US" smtClean="0"/>
-              <a:t>1/15/24</a:t>
+              <a:t>11/27/24</a:t>
             </a:fld>
             <a:endParaRPr lang="en-US"/>
           </a:p>
@@ -2251,7 +2251,7 @@
           <a:p>
             <a:fld id="{B0F4EA63-B69E-FB4F-9474-178B77EAB39C}" type="datetimeFigureOut">
               <a:rPr lang="en-US" smtClean="0"/>
-              <a:t>1/15/24</a:t>
+              <a:t>11/27/24</a:t>
             </a:fld>
             <a:endParaRPr lang="en-US"/>
           </a:p>
@@ -2392,7 +2392,7 @@
           <a:p>
             <a:fld id="{B0F4EA63-B69E-FB4F-9474-178B77EAB39C}" type="datetimeFigureOut">
               <a:rPr lang="en-US" smtClean="0"/>
-              <a:t>1/15/24</a:t>
+              <a:t>11/27/24</a:t>
             </a:fld>
             <a:endParaRPr lang="en-US"/>
           </a:p>
@@ -2505,7 +2505,7 @@
           <a:p>
             <a:fld id="{B0F4EA63-B69E-FB4F-9474-178B77EAB39C}" type="datetimeFigureOut">
               <a:rPr lang="en-US" smtClean="0"/>
-              <a:t>1/15/24</a:t>
+              <a:t>11/27/24</a:t>
             </a:fld>
             <a:endParaRPr lang="en-US"/>
           </a:p>
@@ -2816,7 +2816,7 @@
           <a:p>
             <a:fld id="{B0F4EA63-B69E-FB4F-9474-178B77EAB39C}" type="datetimeFigureOut">
               <a:rPr lang="en-US" smtClean="0"/>
-              <a:t>1/15/24</a:t>
+              <a:t>11/27/24</a:t>
             </a:fld>
             <a:endParaRPr lang="en-US"/>
           </a:p>
@@ -3104,7 +3104,7 @@
           <a:p>
             <a:fld id="{B0F4EA63-B69E-FB4F-9474-178B77EAB39C}" type="datetimeFigureOut">
               <a:rPr lang="en-US" smtClean="0"/>
-              <a:t>1/15/24</a:t>
+              <a:t>11/27/24</a:t>
             </a:fld>
             <a:endParaRPr lang="en-US"/>
           </a:p>
@@ -3345,7 +3345,7 @@
           <a:p>
             <a:fld id="{B0F4EA63-B69E-FB4F-9474-178B77EAB39C}" type="datetimeFigureOut">
               <a:rPr lang="en-US" smtClean="0"/>
-              <a:t>1/15/24</a:t>
+              <a:t>11/27/24</a:t>
             </a:fld>
             <a:endParaRPr lang="en-US"/>
           </a:p>
@@ -3823,7 +3823,7 @@
           <p:nvPr>
             <p:extLst>
               <p:ext uri="{D42A27DB-BD31-4B8C-83A1-F6EECF244321}">
-                <p14:modId xmlns:p14="http://schemas.microsoft.com/office/powerpoint/2010/main" val="2212580782"/>
+                <p14:modId xmlns:p14="http://schemas.microsoft.com/office/powerpoint/2010/main" val="3392365189"/>
               </p:ext>
             </p:extLst>
           </p:nvPr>
@@ -4430,7 +4430,7 @@
           <p:nvPr>
             <p:extLst>
               <p:ext uri="{D42A27DB-BD31-4B8C-83A1-F6EECF244321}">
-                <p14:modId xmlns:p14="http://schemas.microsoft.com/office/powerpoint/2010/main" val="1059033241"/>
+                <p14:modId xmlns:p14="http://schemas.microsoft.com/office/powerpoint/2010/main" val="2482245641"/>
               </p:ext>
             </p:extLst>
           </p:nvPr>
@@ -4664,7 +4664,7 @@
                             <a:schemeClr val="bg1"/>
                           </a:solidFill>
                         </a:rPr>
-                        <a:t>2+4</a:t>
+                        <a:t>1+5</a:t>
                       </a:r>
                     </a:p>
                   </a:txBody>
@@ -4795,7 +4795,7 @@
                             <a:schemeClr val="bg1"/>
                           </a:solidFill>
                         </a:rPr>
-                        <a:t>1+5</a:t>
+                        <a:t>2+4</a:t>
                       </a:r>
                     </a:p>
                   </a:txBody>
@@ -5001,7 +5001,7 @@
           <p:nvPr>
             <p:extLst>
               <p:ext uri="{D42A27DB-BD31-4B8C-83A1-F6EECF244321}">
-                <p14:modId xmlns:p14="http://schemas.microsoft.com/office/powerpoint/2010/main" val="3507018871"/>
+                <p14:modId xmlns:p14="http://schemas.microsoft.com/office/powerpoint/2010/main" val="4044433671"/>
               </p:ext>
             </p:extLst>
           </p:nvPr>
@@ -5862,7 +5862,7 @@
           <p:nvPr>
             <p:extLst>
               <p:ext uri="{D42A27DB-BD31-4B8C-83A1-F6EECF244321}">
-                <p14:modId xmlns:p14="http://schemas.microsoft.com/office/powerpoint/2010/main" val="4157414280"/>
+                <p14:modId xmlns:p14="http://schemas.microsoft.com/office/powerpoint/2010/main" val="2331795656"/>
               </p:ext>
             </p:extLst>
           </p:nvPr>
@@ -6112,7 +6112,7 @@
           <p:nvPr>
             <p:extLst>
               <p:ext uri="{D42A27DB-BD31-4B8C-83A1-F6EECF244321}">
-                <p14:modId xmlns:p14="http://schemas.microsoft.com/office/powerpoint/2010/main" val="1336611469"/>
+                <p14:modId xmlns:p14="http://schemas.microsoft.com/office/powerpoint/2010/main" val="1007101623"/>
               </p:ext>
             </p:extLst>
           </p:nvPr>
@@ -6362,7 +6362,7 @@
           <p:nvPr>
             <p:extLst>
               <p:ext uri="{D42A27DB-BD31-4B8C-83A1-F6EECF244321}">
-                <p14:modId xmlns:p14="http://schemas.microsoft.com/office/powerpoint/2010/main" val="1607268545"/>
+                <p14:modId xmlns:p14="http://schemas.microsoft.com/office/powerpoint/2010/main" val="4207499455"/>
               </p:ext>
             </p:extLst>
           </p:nvPr>
@@ -6612,7 +6612,7 @@
           <p:nvPr>
             <p:extLst>
               <p:ext uri="{D42A27DB-BD31-4B8C-83A1-F6EECF244321}">
-                <p14:modId xmlns:p14="http://schemas.microsoft.com/office/powerpoint/2010/main" val="51404188"/>
+                <p14:modId xmlns:p14="http://schemas.microsoft.com/office/powerpoint/2010/main" val="3743279811"/>
               </p:ext>
             </p:extLst>
           </p:nvPr>
@@ -7476,7 +7476,7 @@
           <p:nvPr>
             <p:extLst>
               <p:ext uri="{D42A27DB-BD31-4B8C-83A1-F6EECF244321}">
-                <p14:modId xmlns:p14="http://schemas.microsoft.com/office/powerpoint/2010/main" val="2912256811"/>
+                <p14:modId xmlns:p14="http://schemas.microsoft.com/office/powerpoint/2010/main" val="317788415"/>
               </p:ext>
             </p:extLst>
           </p:nvPr>

</xml_diff>